<commit_message>
added modeling process review
</commit_message>
<xml_diff>
--- a/modelingProcess.pptx
+++ b/modelingProcess.pptx
@@ -104,7 +104,49 @@
       </a:defRPr>
     </a:lvl9pPr>
   </p:defaultTextStyle>
+  <p:extLst>
+    <p:ext uri="{EFAFB233-063F-42B5-8137-9DF3F51BA10A}">
+      <p15:sldGuideLst xmlns:p15="http://schemas.microsoft.com/office/powerpoint/2012/main"/>
+    </p:ext>
+  </p:extLst>
 </p:presentation>
+</file>
+
+<file path=ppt/changesInfos/changesInfo1.xml><?xml version="1.0" encoding="utf-8"?>
+<pc:chgInfo xmlns:a="http://schemas.openxmlformats.org/drawingml/2006/main" xmlns:r="http://schemas.openxmlformats.org/officeDocument/2006/relationships" xmlns:ac="http://schemas.microsoft.com/office/drawing/2013/main/command" xmlns:pc="http://schemas.microsoft.com/office/powerpoint/2013/main/command">
+  <pc:docChgLst>
+    <pc:chgData name="Eatai Roth" userId="98ed8a96-69e6-48e5-9c61-cd78d65c4cd9" providerId="ADAL" clId="{8180BEEF-429E-0F4F-A961-CBE7FD4636FF}"/>
+    <pc:docChg chg="modSld">
+      <pc:chgData name="Eatai Roth" userId="98ed8a96-69e6-48e5-9c61-cd78d65c4cd9" providerId="ADAL" clId="{8180BEEF-429E-0F4F-A961-CBE7FD4636FF}" dt="2025-04-08T16:40:14.101" v="6" actId="20577"/>
+      <pc:docMkLst>
+        <pc:docMk/>
+      </pc:docMkLst>
+      <pc:sldChg chg="modSp mod">
+        <pc:chgData name="Eatai Roth" userId="98ed8a96-69e6-48e5-9c61-cd78d65c4cd9" providerId="ADAL" clId="{8180BEEF-429E-0F4F-A961-CBE7FD4636FF}" dt="2025-04-08T16:40:14.101" v="6" actId="20577"/>
+        <pc:sldMkLst>
+          <pc:docMk/>
+          <pc:sldMk cId="2882654217" sldId="257"/>
+        </pc:sldMkLst>
+        <pc:spChg chg="mod">
+          <ac:chgData name="Eatai Roth" userId="98ed8a96-69e6-48e5-9c61-cd78d65c4cd9" providerId="ADAL" clId="{8180BEEF-429E-0F4F-A961-CBE7FD4636FF}" dt="2025-04-08T16:40:14.101" v="6" actId="20577"/>
+          <ac:spMkLst>
+            <pc:docMk/>
+            <pc:sldMk cId="2882654217" sldId="257"/>
+            <ac:spMk id="23" creationId="{AA4B7475-D538-7CF8-EEED-56AD0567514B}"/>
+          </ac:spMkLst>
+        </pc:spChg>
+        <pc:spChg chg="mod">
+          <ac:chgData name="Eatai Roth" userId="98ed8a96-69e6-48e5-9c61-cd78d65c4cd9" providerId="ADAL" clId="{8180BEEF-429E-0F4F-A961-CBE7FD4636FF}" dt="2025-04-08T16:40:08.912" v="1" actId="20577"/>
+          <ac:spMkLst>
+            <pc:docMk/>
+            <pc:sldMk cId="2882654217" sldId="257"/>
+            <ac:spMk id="32" creationId="{54D87E5D-D9AF-D1CE-39C2-31B6DC022E81}"/>
+          </ac:spMkLst>
+        </pc:spChg>
+      </pc:sldChg>
+    </pc:docChg>
+  </pc:docChgLst>
+</pc:chgInfo>
 </file>
 
 <file path=ppt/slideLayouts/slideLayout1.xml><?xml version="1.0" encoding="utf-8"?>
@@ -3868,8 +3910,8 @@
                 <a:buChar char="•"/>
               </a:pPr>
               <a:r>
-                <a:rPr lang="en-US" sz="1200" dirty="0" err="1"/>
-                <a:t>GradientBoostedClassifier</a:t>
+                <a:rPr lang="en-US" sz="1200"/>
+                <a:t>GradientBoostingClassifier</a:t>
               </a:r>
               <a:endParaRPr lang="en-US" sz="1200" dirty="0"/>
             </a:p>
@@ -4430,9 +4472,9 @@
         <p:grpSpPr>
           <a:xfrm>
             <a:off x="258430" y="11083662"/>
-            <a:ext cx="7281626" cy="3430594"/>
+            <a:ext cx="7281626" cy="2999707"/>
             <a:chOff x="344773" y="5069226"/>
-            <a:chExt cx="7281626" cy="3430594"/>
+            <a:chExt cx="7281626" cy="2999707"/>
           </a:xfrm>
         </p:grpSpPr>
         <p:sp>
@@ -4511,7 +4553,7 @@
           <p:spPr>
             <a:xfrm>
               <a:off x="344773" y="6253051"/>
-              <a:ext cx="2286000" cy="2246769"/>
+              <a:ext cx="2286000" cy="1815882"/>
             </a:xfrm>
             <a:prstGeom prst="rect">
               <a:avLst/>
@@ -4528,15 +4570,6 @@
               <a:spAutoFit/>
             </a:bodyPr>
             <a:lstStyle/>
-            <a:p>
-              <a:r>
-                <a:rPr lang="en-US" sz="1400" b="1" dirty="0"/>
-                <a:t>Train-test split</a:t>
-              </a:r>
-            </a:p>
-            <a:p>
-              <a:endParaRPr lang="en-US" sz="1400" b="1" dirty="0"/>
-            </a:p>
             <a:p>
               <a:r>
                 <a:rPr lang="en-US" sz="1400" b="1" dirty="0"/>

</xml_diff>